<commit_message>
CSV camilo 2900 pacientes
</commit_message>
<xml_diff>
--- a/Tesis/Nicolas/Presentación 26-07/Análisis de Datos.pptx
+++ b/Tesis/Nicolas/Presentación 26-07/Análisis de Datos.pptx
@@ -241,7 +241,7 @@
           <a:p>
             <a:fld id="{E4272C49-D048-410C-98E1-591529983809}" type="datetimeFigureOut">
               <a:rPr lang="es-CL" smtClean="0"/>
-              <a:t>25-07-2017</a:t>
+              <a:t>26-07-2017</a:t>
             </a:fld>
             <a:endParaRPr lang="es-CL"/>
           </a:p>
@@ -1010,7 +1010,7 @@
           <a:p>
             <a:fld id="{4F5AD7BA-F6AA-4AAB-9A4E-937765467DC4}" type="datetimeFigureOut">
               <a:rPr lang="es-CL" smtClean="0"/>
-              <a:t>25-07-2017</a:t>
+              <a:t>26-07-2017</a:t>
             </a:fld>
             <a:endParaRPr lang="es-CL"/>
           </a:p>
@@ -1218,7 +1218,7 @@
           <a:p>
             <a:fld id="{4F5AD7BA-F6AA-4AAB-9A4E-937765467DC4}" type="datetimeFigureOut">
               <a:rPr lang="es-CL" smtClean="0"/>
-              <a:t>25-07-2017</a:t>
+              <a:t>26-07-2017</a:t>
             </a:fld>
             <a:endParaRPr lang="es-CL"/>
           </a:p>
@@ -1474,7 +1474,7 @@
           <a:p>
             <a:fld id="{4F5AD7BA-F6AA-4AAB-9A4E-937765467DC4}" type="datetimeFigureOut">
               <a:rPr lang="es-CL" smtClean="0"/>
-              <a:t>25-07-2017</a:t>
+              <a:t>26-07-2017</a:t>
             </a:fld>
             <a:endParaRPr lang="es-CL"/>
           </a:p>
@@ -1648,7 +1648,7 @@
           <a:p>
             <a:fld id="{4F5AD7BA-F6AA-4AAB-9A4E-937765467DC4}" type="datetimeFigureOut">
               <a:rPr lang="es-CL" smtClean="0"/>
-              <a:t>25-07-2017</a:t>
+              <a:t>26-07-2017</a:t>
             </a:fld>
             <a:endParaRPr lang="es-CL"/>
           </a:p>
@@ -1991,7 +1991,7 @@
           <a:p>
             <a:fld id="{4F5AD7BA-F6AA-4AAB-9A4E-937765467DC4}" type="datetimeFigureOut">
               <a:rPr lang="es-CL" smtClean="0"/>
-              <a:t>25-07-2017</a:t>
+              <a:t>26-07-2017</a:t>
             </a:fld>
             <a:endParaRPr lang="es-CL"/>
           </a:p>
@@ -2266,7 +2266,7 @@
           <a:p>
             <a:fld id="{4F5AD7BA-F6AA-4AAB-9A4E-937765467DC4}" type="datetimeFigureOut">
               <a:rPr lang="es-CL" smtClean="0"/>
-              <a:t>25-07-2017</a:t>
+              <a:t>26-07-2017</a:t>
             </a:fld>
             <a:endParaRPr lang="es-CL"/>
           </a:p>
@@ -2645,7 +2645,7 @@
           <a:p>
             <a:fld id="{4F5AD7BA-F6AA-4AAB-9A4E-937765467DC4}" type="datetimeFigureOut">
               <a:rPr lang="es-CL" smtClean="0"/>
-              <a:t>25-07-2017</a:t>
+              <a:t>26-07-2017</a:t>
             </a:fld>
             <a:endParaRPr lang="es-CL"/>
           </a:p>
@@ -2763,7 +2763,7 @@
           <a:p>
             <a:fld id="{4F5AD7BA-F6AA-4AAB-9A4E-937765467DC4}" type="datetimeFigureOut">
               <a:rPr lang="es-CL" smtClean="0"/>
-              <a:t>25-07-2017</a:t>
+              <a:t>26-07-2017</a:t>
             </a:fld>
             <a:endParaRPr lang="es-CL"/>
           </a:p>
@@ -2934,7 +2934,7 @@
           <a:p>
             <a:fld id="{4F5AD7BA-F6AA-4AAB-9A4E-937765467DC4}" type="datetimeFigureOut">
               <a:rPr lang="es-CL" smtClean="0"/>
-              <a:t>25-07-2017</a:t>
+              <a:t>26-07-2017</a:t>
             </a:fld>
             <a:endParaRPr lang="es-CL"/>
           </a:p>
@@ -3288,7 +3288,7 @@
           <a:p>
             <a:fld id="{4F5AD7BA-F6AA-4AAB-9A4E-937765467DC4}" type="datetimeFigureOut">
               <a:rPr lang="es-CL" smtClean="0"/>
-              <a:t>25-07-2017</a:t>
+              <a:t>26-07-2017</a:t>
             </a:fld>
             <a:endParaRPr lang="es-CL"/>
           </a:p>
@@ -3670,7 +3670,7 @@
           <a:p>
             <a:fld id="{4F5AD7BA-F6AA-4AAB-9A4E-937765467DC4}" type="datetimeFigureOut">
               <a:rPr lang="es-CL" smtClean="0"/>
-              <a:t>25-07-2017</a:t>
+              <a:t>26-07-2017</a:t>
             </a:fld>
             <a:endParaRPr lang="es-CL"/>
           </a:p>
@@ -3957,7 +3957,7 @@
           <a:p>
             <a:fld id="{4F5AD7BA-F6AA-4AAB-9A4E-937765467DC4}" type="datetimeFigureOut">
               <a:rPr lang="es-CL" smtClean="0"/>
-              <a:t>25-07-2017</a:t>
+              <a:t>26-07-2017</a:t>
             </a:fld>
             <a:endParaRPr lang="es-CL"/>
           </a:p>
@@ -6001,7 +6001,15 @@
             </a:pPr>
             <a:r>
               <a:rPr lang="es-CL" sz="2800" dirty="0" smtClean="0"/>
-              <a:t>Se utilizaran los siguientes parámetros para formar los grupos:</a:t>
+              <a:t>Se </a:t>
+            </a:r>
+            <a:r>
+              <a:rPr lang="es-CL" sz="2800" dirty="0" smtClean="0"/>
+              <a:t>utilizarán </a:t>
+            </a:r>
+            <a:r>
+              <a:rPr lang="es-CL" sz="2800" dirty="0" smtClean="0"/>
+              <a:t>los siguientes parámetros para formar los grupos:</a:t>
             </a:r>
           </a:p>
           <a:p>
@@ -6039,11 +6047,7 @@
             </a:r>
             <a:r>
               <a:rPr lang="es-CL" sz="2800" dirty="0" smtClean="0"/>
-              <a:t>% </a:t>
-            </a:r>
-            <a:r>
-              <a:rPr lang="es-CL" sz="2800" dirty="0" smtClean="0"/>
-              <a:t>y 3%</a:t>
+              <a:t>% y 3%</a:t>
             </a:r>
           </a:p>
           <a:p>
@@ -6899,7 +6903,6 @@
               <a:rPr lang="es-CL" dirty="0"/>
               <a:t>8</a:t>
             </a:r>
-            <a:endParaRPr lang="es-CL" dirty="0"/>
           </a:p>
         </p:txBody>
       </p:sp>
@@ -6929,7 +6932,6 @@
               <a:rPr lang="es-CL" dirty="0" smtClean="0"/>
               <a:t>6</a:t>
             </a:r>
-            <a:endParaRPr lang="es-CL" dirty="0" smtClean="0"/>
           </a:p>
         </p:txBody>
       </p:sp>
@@ -7949,7 +7951,6 @@
               <a:rPr lang="es-CL" dirty="0"/>
               <a:t>8</a:t>
             </a:r>
-            <a:endParaRPr lang="es-CL" dirty="0"/>
           </a:p>
         </p:txBody>
       </p:sp>
@@ -8367,7 +8368,6 @@
               <a:rPr lang="es-CL" dirty="0" smtClean="0"/>
               <a:t>6</a:t>
             </a:r>
-            <a:endParaRPr lang="es-CL" dirty="0" smtClean="0"/>
           </a:p>
         </p:txBody>
       </p:sp>
@@ -9715,6 +9715,13 @@
   <p:clrMapOvr>
     <a:masterClrMapping/>
   </p:clrMapOvr>
+  <p:timing>
+    <p:tnLst>
+      <p:par>
+        <p:cTn id="1" dur="indefinite" restart="never" nodeType="tmRoot"/>
+      </p:par>
+    </p:tnLst>
+  </p:timing>
 </p:sld>
 </file>
 
@@ -9791,6 +9798,13 @@
   <p:clrMapOvr>
     <a:masterClrMapping/>
   </p:clrMapOvr>
+  <p:timing>
+    <p:tnLst>
+      <p:par>
+        <p:cTn id="1" dur="indefinite" restart="never" nodeType="tmRoot"/>
+      </p:par>
+    </p:tnLst>
+  </p:timing>
 </p:sld>
 </file>
 
@@ -10520,7 +10534,19 @@
             <a:pPr lvl="1"/>
             <a:r>
               <a:rPr lang="es-CL" sz="2400" dirty="0" smtClean="0"/>
-              <a:t>Permite a priori, reagrupar los nodos,</a:t>
+              <a:t>Permite a priori, reagrupar los </a:t>
+            </a:r>
+            <a:r>
+              <a:rPr lang="es-CL" sz="2400" dirty="0" smtClean="0"/>
+              <a:t>nodos (</a:t>
+            </a:r>
+            <a:r>
+              <a:rPr lang="es-CL" sz="2400" dirty="0" err="1" smtClean="0"/>
+              <a:t>HeatMap</a:t>
+            </a:r>
+            <a:r>
+              <a:rPr lang="es-CL" sz="2400" dirty="0" smtClean="0"/>
+              <a:t>).</a:t>
             </a:r>
             <a:endParaRPr lang="es-CL" sz="2400" dirty="0"/>
           </a:p>

</xml_diff>